<commit_message>
Deployed 77329d9 with MkDocs version: 0.17.1
</commit_message>
<xml_diff>
--- a/materials/day2/files/osgus18-day2-part2-overlay-differences.pptx
+++ b/materials/day2/files/osgus18-day2-part2-overlay-differences.pptx
@@ -16268,7 +16268,7 @@
                 <a:cs typeface="Consolas"/>
                 <a:sym typeface="Consolas"/>
               </a:rPr>
-              <a:t>periodic_release</a:t>
+              <a:t>periodic_hold</a:t>
             </a:r>
             <a:r>
               <a:rPr lang="en" sz="2400">
@@ -16925,7 +16925,7 @@
           <a:blip r:embed="rId3">
             <a:alphaModFix/>
           </a:blip>
-          <a:srcRect b="1289" l="16260" r="22517" t="236"/>
+          <a:srcRect b="1289" l="14962" r="23815" t="236"/>
           <a:stretch/>
         </p:blipFill>
         <p:spPr>

</xml_diff>